<commit_message>
update building a brochure site and add new building a blog style home page site
</commit_message>
<xml_diff>
--- a/3. Building a Broucher Site.pptx
+++ b/3. Building a Broucher Site.pptx
@@ -283,7 +283,7 @@
             <a:fld id="{F4F6DB86-C2B2-4C0A-BE3A-9E271A736DB1}" type="datetimeFigureOut">
               <a:rPr lang="en-US" smtClean="0"/>
               <a:pPr/>
-              <a:t>5/20/2018</a:t>
+              <a:t>5/21/2018</a:t>
             </a:fld>
             <a:endParaRPr lang="en-US"/>
           </a:p>
@@ -483,7 +483,7 @@
             <a:fld id="{F4F6DB86-C2B2-4C0A-BE3A-9E271A736DB1}" type="datetimeFigureOut">
               <a:rPr lang="en-US" smtClean="0"/>
               <a:pPr/>
-              <a:t>5/20/2018</a:t>
+              <a:t>5/21/2018</a:t>
             </a:fld>
             <a:endParaRPr lang="en-US"/>
           </a:p>
@@ -693,7 +693,7 @@
             <a:fld id="{F4F6DB86-C2B2-4C0A-BE3A-9E271A736DB1}" type="datetimeFigureOut">
               <a:rPr lang="en-US" smtClean="0"/>
               <a:pPr/>
-              <a:t>5/20/2018</a:t>
+              <a:t>5/21/2018</a:t>
             </a:fld>
             <a:endParaRPr lang="en-US"/>
           </a:p>
@@ -893,7 +893,7 @@
             <a:fld id="{F4F6DB86-C2B2-4C0A-BE3A-9E271A736DB1}" type="datetimeFigureOut">
               <a:rPr lang="en-US" smtClean="0"/>
               <a:pPr/>
-              <a:t>5/20/2018</a:t>
+              <a:t>5/21/2018</a:t>
             </a:fld>
             <a:endParaRPr lang="en-US"/>
           </a:p>
@@ -1170,7 +1170,7 @@
             <a:fld id="{F4F6DB86-C2B2-4C0A-BE3A-9E271A736DB1}" type="datetimeFigureOut">
               <a:rPr lang="en-US" smtClean="0"/>
               <a:pPr/>
-              <a:t>5/20/2018</a:t>
+              <a:t>5/21/2018</a:t>
             </a:fld>
             <a:endParaRPr lang="en-US"/>
           </a:p>
@@ -1437,7 +1437,7 @@
             <a:fld id="{F4F6DB86-C2B2-4C0A-BE3A-9E271A736DB1}" type="datetimeFigureOut">
               <a:rPr lang="en-US" smtClean="0"/>
               <a:pPr/>
-              <a:t>5/20/2018</a:t>
+              <a:t>5/21/2018</a:t>
             </a:fld>
             <a:endParaRPr lang="en-US"/>
           </a:p>
@@ -1851,7 +1851,7 @@
             <a:fld id="{F4F6DB86-C2B2-4C0A-BE3A-9E271A736DB1}" type="datetimeFigureOut">
               <a:rPr lang="en-US" smtClean="0"/>
               <a:pPr/>
-              <a:t>5/20/2018</a:t>
+              <a:t>5/21/2018</a:t>
             </a:fld>
             <a:endParaRPr lang="en-US"/>
           </a:p>
@@ -1994,7 +1994,7 @@
             <a:fld id="{F4F6DB86-C2B2-4C0A-BE3A-9E271A736DB1}" type="datetimeFigureOut">
               <a:rPr lang="en-US" smtClean="0"/>
               <a:pPr/>
-              <a:t>5/20/2018</a:t>
+              <a:t>5/21/2018</a:t>
             </a:fld>
             <a:endParaRPr lang="en-US"/>
           </a:p>
@@ -2109,7 +2109,7 @@
             <a:fld id="{F4F6DB86-C2B2-4C0A-BE3A-9E271A736DB1}" type="datetimeFigureOut">
               <a:rPr lang="en-US" smtClean="0"/>
               <a:pPr/>
-              <a:t>5/20/2018</a:t>
+              <a:t>5/21/2018</a:t>
             </a:fld>
             <a:endParaRPr lang="en-US"/>
           </a:p>
@@ -2422,7 +2422,7 @@
             <a:fld id="{F4F6DB86-C2B2-4C0A-BE3A-9E271A736DB1}" type="datetimeFigureOut">
               <a:rPr lang="en-US" smtClean="0"/>
               <a:pPr/>
-              <a:t>5/20/2018</a:t>
+              <a:t>5/21/2018</a:t>
             </a:fld>
             <a:endParaRPr lang="en-US"/>
           </a:p>
@@ -2712,7 +2712,7 @@
             <a:fld id="{F4F6DB86-C2B2-4C0A-BE3A-9E271A736DB1}" type="datetimeFigureOut">
               <a:rPr lang="en-US" smtClean="0"/>
               <a:pPr/>
-              <a:t>5/20/2018</a:t>
+              <a:t>5/21/2018</a:t>
             </a:fld>
             <a:endParaRPr lang="en-US"/>
           </a:p>
@@ -2955,7 +2955,7 @@
             <a:fld id="{F4F6DB86-C2B2-4C0A-BE3A-9E271A736DB1}" type="datetimeFigureOut">
               <a:rPr lang="en-US" smtClean="0"/>
               <a:pPr/>
-              <a:t>5/20/2018</a:t>
+              <a:t>5/21/2018</a:t>
             </a:fld>
             <a:endParaRPr lang="en-US"/>
           </a:p>

</xml_diff>

<commit_message>
Modify Building a Brochure Site And Building a Blog Style Home Page Site
</commit_message>
<xml_diff>
--- a/3. Building a Broucher Site.pptx
+++ b/3. Building a Broucher Site.pptx
@@ -283,7 +283,7 @@
             <a:fld id="{F4F6DB86-C2B2-4C0A-BE3A-9E271A736DB1}" type="datetimeFigureOut">
               <a:rPr lang="en-US" smtClean="0"/>
               <a:pPr/>
-              <a:t>5/21/2018</a:t>
+              <a:t>5/24/2018</a:t>
             </a:fld>
             <a:endParaRPr lang="en-US"/>
           </a:p>
@@ -483,7 +483,7 @@
             <a:fld id="{F4F6DB86-C2B2-4C0A-BE3A-9E271A736DB1}" type="datetimeFigureOut">
               <a:rPr lang="en-US" smtClean="0"/>
               <a:pPr/>
-              <a:t>5/21/2018</a:t>
+              <a:t>5/24/2018</a:t>
             </a:fld>
             <a:endParaRPr lang="en-US"/>
           </a:p>
@@ -693,7 +693,7 @@
             <a:fld id="{F4F6DB86-C2B2-4C0A-BE3A-9E271A736DB1}" type="datetimeFigureOut">
               <a:rPr lang="en-US" smtClean="0"/>
               <a:pPr/>
-              <a:t>5/21/2018</a:t>
+              <a:t>5/24/2018</a:t>
             </a:fld>
             <a:endParaRPr lang="en-US"/>
           </a:p>
@@ -893,7 +893,7 @@
             <a:fld id="{F4F6DB86-C2B2-4C0A-BE3A-9E271A736DB1}" type="datetimeFigureOut">
               <a:rPr lang="en-US" smtClean="0"/>
               <a:pPr/>
-              <a:t>5/21/2018</a:t>
+              <a:t>5/24/2018</a:t>
             </a:fld>
             <a:endParaRPr lang="en-US"/>
           </a:p>
@@ -1170,7 +1170,7 @@
             <a:fld id="{F4F6DB86-C2B2-4C0A-BE3A-9E271A736DB1}" type="datetimeFigureOut">
               <a:rPr lang="en-US" smtClean="0"/>
               <a:pPr/>
-              <a:t>5/21/2018</a:t>
+              <a:t>5/24/2018</a:t>
             </a:fld>
             <a:endParaRPr lang="en-US"/>
           </a:p>
@@ -1437,7 +1437,7 @@
             <a:fld id="{F4F6DB86-C2B2-4C0A-BE3A-9E271A736DB1}" type="datetimeFigureOut">
               <a:rPr lang="en-US" smtClean="0"/>
               <a:pPr/>
-              <a:t>5/21/2018</a:t>
+              <a:t>5/24/2018</a:t>
             </a:fld>
             <a:endParaRPr lang="en-US"/>
           </a:p>
@@ -1851,7 +1851,7 @@
             <a:fld id="{F4F6DB86-C2B2-4C0A-BE3A-9E271A736DB1}" type="datetimeFigureOut">
               <a:rPr lang="en-US" smtClean="0"/>
               <a:pPr/>
-              <a:t>5/21/2018</a:t>
+              <a:t>5/24/2018</a:t>
             </a:fld>
             <a:endParaRPr lang="en-US"/>
           </a:p>
@@ -1994,7 +1994,7 @@
             <a:fld id="{F4F6DB86-C2B2-4C0A-BE3A-9E271A736DB1}" type="datetimeFigureOut">
               <a:rPr lang="en-US" smtClean="0"/>
               <a:pPr/>
-              <a:t>5/21/2018</a:t>
+              <a:t>5/24/2018</a:t>
             </a:fld>
             <a:endParaRPr lang="en-US"/>
           </a:p>
@@ -2109,7 +2109,7 @@
             <a:fld id="{F4F6DB86-C2B2-4C0A-BE3A-9E271A736DB1}" type="datetimeFigureOut">
               <a:rPr lang="en-US" smtClean="0"/>
               <a:pPr/>
-              <a:t>5/21/2018</a:t>
+              <a:t>5/24/2018</a:t>
             </a:fld>
             <a:endParaRPr lang="en-US"/>
           </a:p>
@@ -2422,7 +2422,7 @@
             <a:fld id="{F4F6DB86-C2B2-4C0A-BE3A-9E271A736DB1}" type="datetimeFigureOut">
               <a:rPr lang="en-US" smtClean="0"/>
               <a:pPr/>
-              <a:t>5/21/2018</a:t>
+              <a:t>5/24/2018</a:t>
             </a:fld>
             <a:endParaRPr lang="en-US"/>
           </a:p>
@@ -2712,7 +2712,7 @@
             <a:fld id="{F4F6DB86-C2B2-4C0A-BE3A-9E271A736DB1}" type="datetimeFigureOut">
               <a:rPr lang="en-US" smtClean="0"/>
               <a:pPr/>
-              <a:t>5/21/2018</a:t>
+              <a:t>5/24/2018</a:t>
             </a:fld>
             <a:endParaRPr lang="en-US"/>
           </a:p>
@@ -2955,7 +2955,7 @@
             <a:fld id="{F4F6DB86-C2B2-4C0A-BE3A-9E271A736DB1}" type="datetimeFigureOut">
               <a:rPr lang="en-US" smtClean="0"/>
               <a:pPr/>
-              <a:t>5/21/2018</a:t>
+              <a:t>5/24/2018</a:t>
             </a:fld>
             <a:endParaRPr lang="en-US"/>
           </a:p>
@@ -3459,10 +3459,9 @@
           <a:lstStyle/>
           <a:p>
             <a:r>
-              <a:rPr lang="en-US" dirty="0" smtClean="0"/>
+              <a:rPr lang="en-US" dirty="0"/>
               <a:t>Creating Navigation &amp; sidebar</a:t>
             </a:r>
-            <a:endParaRPr lang="en-US" dirty="0"/>
           </a:p>
         </p:txBody>
       </p:sp>
@@ -3503,23 +3502,68 @@
             <a:spLocks noGrp="1"/>
           </p:cNvSpPr>
           <p:nvPr>
-            <p:ph type="ctrTitle"/>
-          </p:nvPr>
-        </p:nvSpPr>
-        <p:spPr>
-          <a:xfrm>
-            <a:off x="0" y="0"/>
-            <a:ext cx="12192000" cy="6858000"/>
-          </a:xfrm>
-        </p:spPr>
+            <p:ph type="title"/>
+          </p:nvPr>
+        </p:nvSpPr>
+        <p:spPr/>
         <p:txBody>
           <a:bodyPr anchor="ctr"/>
           <a:lstStyle/>
           <a:p>
             <a:r>
-              <a:rPr lang="en-US" dirty="0" smtClean="0"/>
+              <a:rPr lang="en-US" dirty="0"/>
               <a:t>Configure Contact Form</a:t>
             </a:r>
+          </a:p>
+        </p:txBody>
+      </p:sp>
+      <p:sp>
+        <p:nvSpPr>
+          <p:cNvPr id="3" name="Content Placeholder 2">
+            <a:extLst>
+              <a:ext uri="{FF2B5EF4-FFF2-40B4-BE49-F238E27FC236}">
+                <a16:creationId xmlns:a16="http://schemas.microsoft.com/office/drawing/2014/main" id="{7AD37A31-60EC-4B7C-BE23-837809E29C3D}"/>
+              </a:ext>
+            </a:extLst>
+          </p:cNvPr>
+          <p:cNvSpPr>
+            <a:spLocks noGrp="1"/>
+          </p:cNvSpPr>
+          <p:nvPr>
+            <p:ph idx="1"/>
+          </p:nvPr>
+        </p:nvSpPr>
+        <p:spPr/>
+        <p:txBody>
+          <a:bodyPr/>
+          <a:lstStyle/>
+          <a:p>
+            <a:r>
+              <a:rPr lang="en-US" dirty="0"/>
+              <a:t>Make </a:t>
+            </a:r>
+            <a:r>
+              <a:rPr lang="en-US" dirty="0">
+                <a:hlinkClick r:id="rId2"/>
+              </a:rPr>
+              <a:t>Google Account Two Step Verification Off</a:t>
+            </a:r>
+            <a:endParaRPr lang="en-US" dirty="0"/>
+          </a:p>
+          <a:p>
+            <a:r>
+              <a:rPr lang="en-US" dirty="0"/>
+              <a:t>Make </a:t>
+            </a:r>
+            <a:r>
+              <a:rPr lang="en-US" dirty="0">
+                <a:hlinkClick r:id="rId3"/>
+              </a:rPr>
+              <a:t>Google Account Less Secure</a:t>
+            </a:r>
+            <a:endParaRPr lang="en-US" dirty="0"/>
+          </a:p>
+          <a:p>
             <a:endParaRPr lang="en-US" dirty="0"/>
           </a:p>
         </p:txBody>
@@ -3561,22 +3605,47 @@
             <a:spLocks noGrp="1"/>
           </p:cNvSpPr>
           <p:nvPr>
-            <p:ph type="ctrTitle"/>
-          </p:nvPr>
-        </p:nvSpPr>
-        <p:spPr>
-          <a:xfrm>
-            <a:off x="0" y="0"/>
-            <a:ext cx="12192000" cy="6858000"/>
-          </a:xfrm>
-        </p:spPr>
+            <p:ph type="title"/>
+          </p:nvPr>
+        </p:nvSpPr>
+        <p:spPr/>
         <p:txBody>
           <a:bodyPr anchor="ctr"/>
           <a:lstStyle/>
           <a:p>
             <a:r>
-              <a:rPr lang="en-US" dirty="0" smtClean="0"/>
+              <a:rPr lang="en-US" dirty="0"/>
               <a:t>Configure Google Maps</a:t>
+            </a:r>
+          </a:p>
+        </p:txBody>
+      </p:sp>
+      <p:sp>
+        <p:nvSpPr>
+          <p:cNvPr id="3" name="Content Placeholder 2">
+            <a:extLst>
+              <a:ext uri="{FF2B5EF4-FFF2-40B4-BE49-F238E27FC236}">
+                <a16:creationId xmlns:a16="http://schemas.microsoft.com/office/drawing/2014/main" id="{B1D256E8-EC35-408F-8865-19ABFBE5F585}"/>
+              </a:ext>
+            </a:extLst>
+          </p:cNvPr>
+          <p:cNvSpPr>
+            <a:spLocks noGrp="1"/>
+          </p:cNvSpPr>
+          <p:nvPr>
+            <p:ph idx="1"/>
+          </p:nvPr>
+        </p:nvSpPr>
+        <p:spPr/>
+        <p:txBody>
+          <a:bodyPr/>
+          <a:lstStyle/>
+          <a:p>
+            <a:r>
+              <a:rPr lang="en-US" dirty="0">
+                <a:hlinkClick r:id="rId2"/>
+              </a:rPr>
+              <a:t>https://console.developers.google.com/apis/dashboard</a:t>
             </a:r>
             <a:endParaRPr lang="en-US" dirty="0"/>
           </a:p>
@@ -3633,10 +3702,9 @@
           <a:lstStyle/>
           <a:p>
             <a:r>
-              <a:rPr lang="en-US" dirty="0" smtClean="0"/>
+              <a:rPr lang="en-US" dirty="0"/>
               <a:t>Configure Google Analytics</a:t>
             </a:r>
-            <a:endParaRPr lang="en-US" dirty="0"/>
           </a:p>
         </p:txBody>
       </p:sp>
@@ -3695,7 +3763,7 @@
               <a:t>Installing </a:t>
             </a:r>
             <a:r>
-              <a:rPr lang="en-US" dirty="0" err="1" smtClean="0"/>
+              <a:rPr lang="en-US" dirty="0" err="1"/>
               <a:t>Wordpress</a:t>
             </a:r>
             <a:endParaRPr lang="en-US" dirty="0"/>
@@ -3748,19 +3816,19 @@
           <a:lstStyle/>
           <a:p>
             <a:r>
-              <a:rPr lang="en-US" dirty="0" smtClean="0"/>
+              <a:rPr lang="en-US" dirty="0"/>
               <a:t>Changing Website URL</a:t>
             </a:r>
           </a:p>
           <a:p>
             <a:r>
-              <a:rPr lang="en-US" dirty="0" smtClean="0"/>
+              <a:rPr lang="en-US" dirty="0"/>
               <a:t>Changing User Name</a:t>
             </a:r>
           </a:p>
           <a:p>
             <a:r>
-              <a:rPr lang="en-US" dirty="0" smtClean="0"/>
+              <a:rPr lang="en-US" dirty="0"/>
               <a:t>Editing functions.php</a:t>
             </a:r>
           </a:p>
@@ -3782,19 +3850,19 @@
           <a:lstStyle/>
           <a:p>
             <a:r>
-              <a:rPr lang="en-US" dirty="0" smtClean="0"/>
+              <a:rPr lang="en-US" dirty="0"/>
               <a:t>Explore </a:t>
             </a:r>
             <a:r>
-              <a:rPr lang="en-US" dirty="0" err="1" smtClean="0"/>
+              <a:rPr lang="en-US" dirty="0" err="1"/>
               <a:t>Wordpress</a:t>
             </a:r>
             <a:r>
-              <a:rPr lang="en-US" dirty="0" smtClean="0"/>
+              <a:rPr lang="en-US" dirty="0"/>
               <a:t> Files &amp; </a:t>
             </a:r>
             <a:r>
-              <a:rPr lang="en-US" dirty="0" err="1" smtClean="0"/>
+              <a:rPr lang="en-US" dirty="0" err="1"/>
               <a:t>DataBase</a:t>
             </a:r>
             <a:endParaRPr lang="en-US" dirty="0"/>
@@ -3852,14 +3920,13 @@
           <a:lstStyle/>
           <a:p>
             <a:r>
-              <a:rPr lang="en-US" dirty="0" err="1" smtClean="0"/>
+              <a:rPr lang="en-US" dirty="0" err="1"/>
               <a:t>Wordpress</a:t>
             </a:r>
             <a:r>
-              <a:rPr lang="en-US" dirty="0" smtClean="0"/>
+              <a:rPr lang="en-US" dirty="0"/>
               <a:t> Defaults</a:t>
             </a:r>
-            <a:endParaRPr lang="en-US" dirty="0"/>
           </a:p>
         </p:txBody>
       </p:sp>
@@ -3971,12 +4038,8 @@
           <a:lstStyle/>
           <a:p>
             <a:r>
-              <a:rPr lang="en-US" dirty="0" smtClean="0"/>
-              <a:t>Generating </a:t>
-            </a:r>
-            <a:r>
               <a:rPr lang="en-US" dirty="0"/>
-              <a:t>Salt Key</a:t>
+              <a:t>Generating Salt Key</a:t>
             </a:r>
           </a:p>
         </p:txBody>
@@ -4104,13 +4167,7 @@
               <a:rPr lang="en-US" sz="4000" dirty="0">
                 <a:latin typeface="+mj-lt"/>
               </a:rPr>
-              <a:t>Contact Form </a:t>
-            </a:r>
-            <a:r>
-              <a:rPr lang="en-US" sz="4000" dirty="0" smtClean="0">
-                <a:latin typeface="+mj-lt"/>
-              </a:rPr>
-              <a:t>7</a:t>
+              <a:t>Contact Form 7</a:t>
             </a:r>
           </a:p>
           <a:p>
@@ -4119,14 +4176,11 @@
               <a:buAutoNum type="arabicPeriod"/>
             </a:pPr>
             <a:r>
-              <a:rPr lang="en-US" sz="4000" dirty="0" smtClean="0">
+              <a:rPr lang="en-US" sz="4000" dirty="0">
                 <a:latin typeface="+mj-lt"/>
               </a:rPr>
               <a:t>WP Mail SMTP</a:t>
             </a:r>
-            <a:endParaRPr lang="en-US" sz="4000" dirty="0">
-              <a:latin typeface="+mj-lt"/>
-            </a:endParaRPr>
           </a:p>
           <a:p>
             <a:pPr marL="742950" indent="-742950">
@@ -4149,17 +4203,8 @@
               <a:rPr lang="en-US" sz="4000" dirty="0">
                 <a:latin typeface="+mj-lt"/>
               </a:rPr>
-              <a:t>Google </a:t>
-            </a:r>
-            <a:r>
-              <a:rPr lang="en-US" sz="4000" dirty="0" smtClean="0">
-                <a:latin typeface="+mj-lt"/>
-              </a:rPr>
-              <a:t>Maps</a:t>
-            </a:r>
-            <a:endParaRPr lang="en-US" sz="4000" dirty="0">
-              <a:latin typeface="+mj-lt"/>
-            </a:endParaRPr>
+              <a:t>Google Maps</a:t>
+            </a:r>
           </a:p>
           <a:p>
             <a:pPr marL="742950" indent="-742950">
@@ -4170,17 +4215,8 @@
               <a:rPr lang="en-US" sz="4000" dirty="0">
                 <a:latin typeface="+mj-lt"/>
               </a:rPr>
-              <a:t>Google </a:t>
-            </a:r>
-            <a:r>
-              <a:rPr lang="en-US" sz="4000" dirty="0" smtClean="0">
-                <a:latin typeface="+mj-lt"/>
-              </a:rPr>
-              <a:t>Analytics</a:t>
-            </a:r>
-            <a:endParaRPr lang="en-US" sz="4000" dirty="0">
-              <a:latin typeface="+mj-lt"/>
-            </a:endParaRPr>
+              <a:t>Google Analytics</a:t>
+            </a:r>
           </a:p>
           <a:p>
             <a:pPr marL="742950" indent="-742950">
@@ -4244,10 +4280,9 @@
           <a:lstStyle/>
           <a:p>
             <a:r>
-              <a:rPr lang="en-US" dirty="0" smtClean="0"/>
+              <a:rPr lang="en-US" dirty="0"/>
               <a:t>Static Home Page &amp; Posts</a:t>
             </a:r>
-            <a:endParaRPr lang="en-US" dirty="0"/>
           </a:p>
         </p:txBody>
       </p:sp>

</xml_diff>

<commit_message>
Modify Building a Brochure Site
</commit_message>
<xml_diff>
--- a/3. Building a Broucher Site.pptx
+++ b/3. Building a Broucher Site.pptx
@@ -283,7 +283,7 @@
             <a:fld id="{F4F6DB86-C2B2-4C0A-BE3A-9E271A736DB1}" type="datetimeFigureOut">
               <a:rPr lang="en-US" smtClean="0"/>
               <a:pPr/>
-              <a:t>5/24/2018</a:t>
+              <a:t>5/25/2018</a:t>
             </a:fld>
             <a:endParaRPr lang="en-US"/>
           </a:p>
@@ -483,7 +483,7 @@
             <a:fld id="{F4F6DB86-C2B2-4C0A-BE3A-9E271A736DB1}" type="datetimeFigureOut">
               <a:rPr lang="en-US" smtClean="0"/>
               <a:pPr/>
-              <a:t>5/24/2018</a:t>
+              <a:t>5/25/2018</a:t>
             </a:fld>
             <a:endParaRPr lang="en-US"/>
           </a:p>
@@ -693,7 +693,7 @@
             <a:fld id="{F4F6DB86-C2B2-4C0A-BE3A-9E271A736DB1}" type="datetimeFigureOut">
               <a:rPr lang="en-US" smtClean="0"/>
               <a:pPr/>
-              <a:t>5/24/2018</a:t>
+              <a:t>5/25/2018</a:t>
             </a:fld>
             <a:endParaRPr lang="en-US"/>
           </a:p>
@@ -893,7 +893,7 @@
             <a:fld id="{F4F6DB86-C2B2-4C0A-BE3A-9E271A736DB1}" type="datetimeFigureOut">
               <a:rPr lang="en-US" smtClean="0"/>
               <a:pPr/>
-              <a:t>5/24/2018</a:t>
+              <a:t>5/25/2018</a:t>
             </a:fld>
             <a:endParaRPr lang="en-US"/>
           </a:p>
@@ -1170,7 +1170,7 @@
             <a:fld id="{F4F6DB86-C2B2-4C0A-BE3A-9E271A736DB1}" type="datetimeFigureOut">
               <a:rPr lang="en-US" smtClean="0"/>
               <a:pPr/>
-              <a:t>5/24/2018</a:t>
+              <a:t>5/25/2018</a:t>
             </a:fld>
             <a:endParaRPr lang="en-US"/>
           </a:p>
@@ -1437,7 +1437,7 @@
             <a:fld id="{F4F6DB86-C2B2-4C0A-BE3A-9E271A736DB1}" type="datetimeFigureOut">
               <a:rPr lang="en-US" smtClean="0"/>
               <a:pPr/>
-              <a:t>5/24/2018</a:t>
+              <a:t>5/25/2018</a:t>
             </a:fld>
             <a:endParaRPr lang="en-US"/>
           </a:p>
@@ -1851,7 +1851,7 @@
             <a:fld id="{F4F6DB86-C2B2-4C0A-BE3A-9E271A736DB1}" type="datetimeFigureOut">
               <a:rPr lang="en-US" smtClean="0"/>
               <a:pPr/>
-              <a:t>5/24/2018</a:t>
+              <a:t>5/25/2018</a:t>
             </a:fld>
             <a:endParaRPr lang="en-US"/>
           </a:p>
@@ -1994,7 +1994,7 @@
             <a:fld id="{F4F6DB86-C2B2-4C0A-BE3A-9E271A736DB1}" type="datetimeFigureOut">
               <a:rPr lang="en-US" smtClean="0"/>
               <a:pPr/>
-              <a:t>5/24/2018</a:t>
+              <a:t>5/25/2018</a:t>
             </a:fld>
             <a:endParaRPr lang="en-US"/>
           </a:p>
@@ -2109,7 +2109,7 @@
             <a:fld id="{F4F6DB86-C2B2-4C0A-BE3A-9E271A736DB1}" type="datetimeFigureOut">
               <a:rPr lang="en-US" smtClean="0"/>
               <a:pPr/>
-              <a:t>5/24/2018</a:t>
+              <a:t>5/25/2018</a:t>
             </a:fld>
             <a:endParaRPr lang="en-US"/>
           </a:p>
@@ -2422,7 +2422,7 @@
             <a:fld id="{F4F6DB86-C2B2-4C0A-BE3A-9E271A736DB1}" type="datetimeFigureOut">
               <a:rPr lang="en-US" smtClean="0"/>
               <a:pPr/>
-              <a:t>5/24/2018</a:t>
+              <a:t>5/25/2018</a:t>
             </a:fld>
             <a:endParaRPr lang="en-US"/>
           </a:p>
@@ -2712,7 +2712,7 @@
             <a:fld id="{F4F6DB86-C2B2-4C0A-BE3A-9E271A736DB1}" type="datetimeFigureOut">
               <a:rPr lang="en-US" smtClean="0"/>
               <a:pPr/>
-              <a:t>5/24/2018</a:t>
+              <a:t>5/25/2018</a:t>
             </a:fld>
             <a:endParaRPr lang="en-US"/>
           </a:p>
@@ -2955,7 +2955,7 @@
             <a:fld id="{F4F6DB86-C2B2-4C0A-BE3A-9E271A736DB1}" type="datetimeFigureOut">
               <a:rPr lang="en-US" smtClean="0"/>
               <a:pPr/>
-              <a:t>5/24/2018</a:t>
+              <a:t>5/25/2018</a:t>
             </a:fld>
             <a:endParaRPr lang="en-US"/>
           </a:p>
@@ -3688,15 +3688,10 @@
             <a:spLocks noGrp="1"/>
           </p:cNvSpPr>
           <p:nvPr>
-            <p:ph type="ctrTitle"/>
-          </p:nvPr>
-        </p:nvSpPr>
-        <p:spPr>
-          <a:xfrm>
-            <a:off x="0" y="0"/>
-            <a:ext cx="12192000" cy="6858000"/>
-          </a:xfrm>
-        </p:spPr>
+            <p:ph type="title"/>
+          </p:nvPr>
+        </p:nvSpPr>
+        <p:spPr/>
         <p:txBody>
           <a:bodyPr anchor="ctr"/>
           <a:lstStyle/>
@@ -3705,6 +3700,31 @@
               <a:rPr lang="en-US" dirty="0"/>
               <a:t>Configure Google Analytics</a:t>
             </a:r>
+          </a:p>
+        </p:txBody>
+      </p:sp>
+      <p:sp>
+        <p:nvSpPr>
+          <p:cNvPr id="3" name="Content Placeholder 2"/>
+          <p:cNvSpPr>
+            <a:spLocks noGrp="1"/>
+          </p:cNvSpPr>
+          <p:nvPr>
+            <p:ph idx="1"/>
+          </p:nvPr>
+        </p:nvSpPr>
+        <p:spPr/>
+        <p:txBody>
+          <a:bodyPr/>
+          <a:lstStyle/>
+          <a:p>
+            <a:r>
+              <a:rPr lang="en-US" dirty="0" smtClean="0">
+                <a:hlinkClick r:id="rId2"/>
+              </a:rPr>
+              <a:t>http://analytics.google.com</a:t>
+            </a:r>
+            <a:endParaRPr lang="en-US" dirty="0"/>
           </a:p>
         </p:txBody>
       </p:sp>

</xml_diff>

<commit_message>
Modify Blog Style Home Page Site and add new wordpress security
</commit_message>
<xml_diff>
--- a/3. Building a Broucher Site.pptx
+++ b/3. Building a Broucher Site.pptx
@@ -18,6 +18,13 @@
     <p:sldId id="271" r:id="rId12"/>
     <p:sldId id="272" r:id="rId13"/>
     <p:sldId id="273" r:id="rId14"/>
+    <p:sldId id="274" r:id="rId15"/>
+    <p:sldId id="275" r:id="rId16"/>
+    <p:sldId id="277" r:id="rId17"/>
+    <p:sldId id="278" r:id="rId18"/>
+    <p:sldId id="279" r:id="rId19"/>
+    <p:sldId id="280" r:id="rId20"/>
+    <p:sldId id="281" r:id="rId21"/>
   </p:sldIdLst>
   <p:sldSz cx="12192000" cy="6858000"/>
   <p:notesSz cx="6858000" cy="9144000"/>
@@ -3691,40 +3698,21 @@
             <p:ph type="title"/>
           </p:nvPr>
         </p:nvSpPr>
-        <p:spPr/>
+        <p:spPr>
+          <a:xfrm>
+            <a:off x="0" y="1"/>
+            <a:ext cx="12192000" cy="6858000"/>
+          </a:xfrm>
+        </p:spPr>
         <p:txBody>
           <a:bodyPr anchor="ctr"/>
           <a:lstStyle/>
           <a:p>
+            <a:pPr algn="ctr"/>
             <a:r>
               <a:rPr lang="en-US" dirty="0"/>
               <a:t>Configure Google Analytics</a:t>
             </a:r>
-          </a:p>
-        </p:txBody>
-      </p:sp>
-      <p:sp>
-        <p:nvSpPr>
-          <p:cNvPr id="3" name="Content Placeholder 2"/>
-          <p:cNvSpPr>
-            <a:spLocks noGrp="1"/>
-          </p:cNvSpPr>
-          <p:nvPr>
-            <p:ph idx="1"/>
-          </p:nvPr>
-        </p:nvSpPr>
-        <p:spPr/>
-        <p:txBody>
-          <a:bodyPr/>
-          <a:lstStyle/>
-          <a:p>
-            <a:r>
-              <a:rPr lang="en-US" dirty="0" smtClean="0">
-                <a:hlinkClick r:id="rId2"/>
-              </a:rPr>
-              <a:t>http://analytics.google.com</a:t>
-            </a:r>
-            <a:endParaRPr lang="en-US" dirty="0"/>
           </a:p>
         </p:txBody>
       </p:sp>
@@ -3738,6 +3726,950 @@
   <p:clrMapOvr>
     <a:masterClrMapping/>
   </p:clrMapOvr>
+  <p:timing>
+    <p:tnLst>
+      <p:par>
+        <p:cTn id="1" dur="indefinite" restart="never" nodeType="tmRoot"/>
+      </p:par>
+    </p:tnLst>
+  </p:timing>
+</p:sld>
+</file>
+
+<file path=ppt/slides/slide14.xml><?xml version="1.0" encoding="utf-8"?>
+<p:sld xmlns:a="http://schemas.openxmlformats.org/drawingml/2006/main" xmlns:r="http://schemas.openxmlformats.org/officeDocument/2006/relationships" xmlns:p="http://schemas.openxmlformats.org/presentationml/2006/main">
+  <p:cSld>
+    <p:spTree>
+      <p:nvGrpSpPr>
+        <p:cNvPr id="1" name=""/>
+        <p:cNvGrpSpPr/>
+        <p:nvPr/>
+      </p:nvGrpSpPr>
+      <p:grpSpPr>
+        <a:xfrm>
+          <a:off x="0" y="0"/>
+          <a:ext cx="0" cy="0"/>
+          <a:chOff x="0" y="0"/>
+          <a:chExt cx="0" cy="0"/>
+        </a:xfrm>
+      </p:grpSpPr>
+      <p:sp>
+        <p:nvSpPr>
+          <p:cNvPr id="4" name="Title 3"/>
+          <p:cNvSpPr>
+            <a:spLocks noGrp="1"/>
+          </p:cNvSpPr>
+          <p:nvPr>
+            <p:ph type="title"/>
+          </p:nvPr>
+        </p:nvSpPr>
+        <p:spPr/>
+        <p:txBody>
+          <a:bodyPr/>
+          <a:lstStyle/>
+          <a:p>
+            <a:r>
+              <a:rPr lang="en-US" dirty="0"/>
+              <a:t>What can do with Google Analytics</a:t>
+            </a:r>
+            <a:r>
+              <a:rPr lang="en-US" dirty="0" smtClean="0"/>
+              <a:t>?</a:t>
+            </a:r>
+            <a:endParaRPr lang="en-US" dirty="0"/>
+          </a:p>
+        </p:txBody>
+      </p:sp>
+      <p:pic>
+        <p:nvPicPr>
+          <p:cNvPr id="8" name="Picture 7"/>
+          <p:cNvPicPr>
+            <a:picLocks noChangeAspect="1"/>
+          </p:cNvPicPr>
+          <p:nvPr/>
+        </p:nvPicPr>
+        <p:blipFill>
+          <a:blip r:embed="rId2">
+            <a:extLst>
+              <a:ext uri="{28A0092B-C50C-407E-A947-70E740481C1C}">
+                <a14:useLocalDpi xmlns:a14="http://schemas.microsoft.com/office/drawing/2010/main" val="0"/>
+              </a:ext>
+            </a:extLst>
+          </a:blip>
+          <a:stretch>
+            <a:fillRect/>
+          </a:stretch>
+        </p:blipFill>
+        <p:spPr>
+          <a:xfrm>
+            <a:off x="838200" y="2888531"/>
+            <a:ext cx="3303706" cy="2271298"/>
+          </a:xfrm>
+          <a:prstGeom prst="rect">
+            <a:avLst/>
+          </a:prstGeom>
+        </p:spPr>
+      </p:pic>
+      <p:cxnSp>
+        <p:nvCxnSpPr>
+          <p:cNvPr id="12" name="Straight Connector 11"/>
+          <p:cNvCxnSpPr/>
+          <p:nvPr/>
+        </p:nvCxnSpPr>
+        <p:spPr>
+          <a:xfrm>
+            <a:off x="4141905" y="4024180"/>
+            <a:ext cx="1643731" cy="0"/>
+          </a:xfrm>
+          <a:prstGeom prst="line">
+            <a:avLst/>
+          </a:prstGeom>
+          <a:ln w="57150">
+            <a:solidFill>
+              <a:schemeClr val="accent2">
+                <a:lumMod val="60000"/>
+                <a:lumOff val="40000"/>
+              </a:schemeClr>
+            </a:solidFill>
+          </a:ln>
+        </p:spPr>
+        <p:style>
+          <a:lnRef idx="1">
+            <a:schemeClr val="dk1"/>
+          </a:lnRef>
+          <a:fillRef idx="0">
+            <a:schemeClr val="dk1"/>
+          </a:fillRef>
+          <a:effectRef idx="0">
+            <a:schemeClr val="dk1"/>
+          </a:effectRef>
+          <a:fontRef idx="minor">
+            <a:schemeClr val="tx1"/>
+          </a:fontRef>
+        </p:style>
+      </p:cxnSp>
+      <p:pic>
+        <p:nvPicPr>
+          <p:cNvPr id="14" name="Picture 13"/>
+          <p:cNvPicPr>
+            <a:picLocks noChangeAspect="1"/>
+          </p:cNvPicPr>
+          <p:nvPr/>
+        </p:nvPicPr>
+        <p:blipFill>
+          <a:blip r:embed="rId3">
+            <a:extLst>
+              <a:ext uri="{28A0092B-C50C-407E-A947-70E740481C1C}">
+                <a14:useLocalDpi xmlns:a14="http://schemas.microsoft.com/office/drawing/2010/main" val="0"/>
+              </a:ext>
+            </a:extLst>
+          </a:blip>
+          <a:stretch>
+            <a:fillRect/>
+          </a:stretch>
+        </p:blipFill>
+        <p:spPr>
+          <a:xfrm>
+            <a:off x="5785636" y="3727285"/>
+            <a:ext cx="1995766" cy="871659"/>
+          </a:xfrm>
+          <a:prstGeom prst="rect">
+            <a:avLst/>
+          </a:prstGeom>
+        </p:spPr>
+      </p:pic>
+      <p:cxnSp>
+        <p:nvCxnSpPr>
+          <p:cNvPr id="15" name="Straight Connector 14"/>
+          <p:cNvCxnSpPr/>
+          <p:nvPr/>
+        </p:nvCxnSpPr>
+        <p:spPr>
+          <a:xfrm>
+            <a:off x="4141906" y="4163115"/>
+            <a:ext cx="1643731" cy="0"/>
+          </a:xfrm>
+          <a:prstGeom prst="line">
+            <a:avLst/>
+          </a:prstGeom>
+          <a:ln w="57150">
+            <a:solidFill>
+              <a:schemeClr val="accent1">
+                <a:lumMod val="60000"/>
+                <a:lumOff val="40000"/>
+              </a:schemeClr>
+            </a:solidFill>
+          </a:ln>
+        </p:spPr>
+        <p:style>
+          <a:lnRef idx="1">
+            <a:schemeClr val="dk1"/>
+          </a:lnRef>
+          <a:fillRef idx="0">
+            <a:schemeClr val="dk1"/>
+          </a:fillRef>
+          <a:effectRef idx="0">
+            <a:schemeClr val="dk1"/>
+          </a:effectRef>
+          <a:fontRef idx="minor">
+            <a:schemeClr val="tx1"/>
+          </a:fontRef>
+        </p:style>
+      </p:cxnSp>
+      <p:cxnSp>
+        <p:nvCxnSpPr>
+          <p:cNvPr id="16" name="Straight Connector 15"/>
+          <p:cNvCxnSpPr/>
+          <p:nvPr/>
+        </p:nvCxnSpPr>
+        <p:spPr>
+          <a:xfrm>
+            <a:off x="4141905" y="4332932"/>
+            <a:ext cx="1643731" cy="0"/>
+          </a:xfrm>
+          <a:prstGeom prst="line">
+            <a:avLst/>
+          </a:prstGeom>
+          <a:ln w="57150">
+            <a:solidFill>
+              <a:schemeClr val="bg1">
+                <a:lumMod val="65000"/>
+              </a:schemeClr>
+            </a:solidFill>
+          </a:ln>
+        </p:spPr>
+        <p:style>
+          <a:lnRef idx="1">
+            <a:schemeClr val="dk1"/>
+          </a:lnRef>
+          <a:fillRef idx="0">
+            <a:schemeClr val="dk1"/>
+          </a:fillRef>
+          <a:effectRef idx="0">
+            <a:schemeClr val="dk1"/>
+          </a:effectRef>
+          <a:fontRef idx="minor">
+            <a:schemeClr val="tx1"/>
+          </a:fontRef>
+        </p:style>
+      </p:cxnSp>
+      <p:cxnSp>
+        <p:nvCxnSpPr>
+          <p:cNvPr id="17" name="Straight Connector 16"/>
+          <p:cNvCxnSpPr/>
+          <p:nvPr/>
+        </p:nvCxnSpPr>
+        <p:spPr>
+          <a:xfrm>
+            <a:off x="7781402" y="4024180"/>
+            <a:ext cx="1643731" cy="0"/>
+          </a:xfrm>
+          <a:prstGeom prst="line">
+            <a:avLst/>
+          </a:prstGeom>
+          <a:ln w="57150">
+            <a:solidFill>
+              <a:schemeClr val="accent2">
+                <a:lumMod val="60000"/>
+                <a:lumOff val="40000"/>
+              </a:schemeClr>
+            </a:solidFill>
+          </a:ln>
+        </p:spPr>
+        <p:style>
+          <a:lnRef idx="1">
+            <a:schemeClr val="dk1"/>
+          </a:lnRef>
+          <a:fillRef idx="0">
+            <a:schemeClr val="dk1"/>
+          </a:fillRef>
+          <a:effectRef idx="0">
+            <a:schemeClr val="dk1"/>
+          </a:effectRef>
+          <a:fontRef idx="minor">
+            <a:schemeClr val="tx1"/>
+          </a:fontRef>
+        </p:style>
+      </p:cxnSp>
+      <p:cxnSp>
+        <p:nvCxnSpPr>
+          <p:cNvPr id="18" name="Straight Connector 17"/>
+          <p:cNvCxnSpPr/>
+          <p:nvPr/>
+        </p:nvCxnSpPr>
+        <p:spPr>
+          <a:xfrm>
+            <a:off x="7781401" y="4163114"/>
+            <a:ext cx="1643731" cy="0"/>
+          </a:xfrm>
+          <a:prstGeom prst="line">
+            <a:avLst/>
+          </a:prstGeom>
+          <a:ln w="57150">
+            <a:solidFill>
+              <a:schemeClr val="accent1">
+                <a:lumMod val="60000"/>
+                <a:lumOff val="40000"/>
+              </a:schemeClr>
+            </a:solidFill>
+          </a:ln>
+        </p:spPr>
+        <p:style>
+          <a:lnRef idx="1">
+            <a:schemeClr val="dk1"/>
+          </a:lnRef>
+          <a:fillRef idx="0">
+            <a:schemeClr val="dk1"/>
+          </a:fillRef>
+          <a:effectRef idx="0">
+            <a:schemeClr val="dk1"/>
+          </a:effectRef>
+          <a:fontRef idx="minor">
+            <a:schemeClr val="tx1"/>
+          </a:fontRef>
+        </p:style>
+      </p:cxnSp>
+      <p:cxnSp>
+        <p:nvCxnSpPr>
+          <p:cNvPr id="19" name="Straight Connector 18"/>
+          <p:cNvCxnSpPr/>
+          <p:nvPr/>
+        </p:nvCxnSpPr>
+        <p:spPr>
+          <a:xfrm>
+            <a:off x="7781400" y="4306807"/>
+            <a:ext cx="1643731" cy="0"/>
+          </a:xfrm>
+          <a:prstGeom prst="line">
+            <a:avLst/>
+          </a:prstGeom>
+          <a:ln w="57150">
+            <a:solidFill>
+              <a:schemeClr val="bg1">
+                <a:lumMod val="65000"/>
+              </a:schemeClr>
+            </a:solidFill>
+          </a:ln>
+        </p:spPr>
+        <p:style>
+          <a:lnRef idx="1">
+            <a:schemeClr val="dk1"/>
+          </a:lnRef>
+          <a:fillRef idx="0">
+            <a:schemeClr val="dk1"/>
+          </a:fillRef>
+          <a:effectRef idx="0">
+            <a:schemeClr val="dk1"/>
+          </a:effectRef>
+          <a:fontRef idx="minor">
+            <a:schemeClr val="tx1"/>
+          </a:fontRef>
+        </p:style>
+      </p:cxnSp>
+      <p:pic>
+        <p:nvPicPr>
+          <p:cNvPr id="20" name="Picture 19"/>
+          <p:cNvPicPr>
+            <a:picLocks noChangeAspect="1"/>
+          </p:cNvPicPr>
+          <p:nvPr/>
+        </p:nvPicPr>
+        <p:blipFill>
+          <a:blip r:embed="rId4">
+            <a:extLst>
+              <a:ext uri="{28A0092B-C50C-407E-A947-70E740481C1C}">
+                <a14:useLocalDpi xmlns:a14="http://schemas.microsoft.com/office/drawing/2010/main" val="0"/>
+              </a:ext>
+            </a:extLst>
+          </a:blip>
+          <a:stretch>
+            <a:fillRect/>
+          </a:stretch>
+        </p:blipFill>
+        <p:spPr>
+          <a:xfrm>
+            <a:off x="9425131" y="3041803"/>
+            <a:ext cx="2071166" cy="2118026"/>
+          </a:xfrm>
+          <a:prstGeom prst="rect">
+            <a:avLst/>
+          </a:prstGeom>
+        </p:spPr>
+      </p:pic>
+      <p:sp>
+        <p:nvSpPr>
+          <p:cNvPr id="21" name="TextBox 20"/>
+          <p:cNvSpPr txBox="1"/>
+          <p:nvPr/>
+        </p:nvSpPr>
+        <p:spPr>
+          <a:xfrm>
+            <a:off x="8951807" y="5272058"/>
+            <a:ext cx="3017814" cy="369332"/>
+          </a:xfrm>
+          <a:prstGeom prst="rect">
+            <a:avLst/>
+          </a:prstGeom>
+          <a:noFill/>
+        </p:spPr>
+        <p:txBody>
+          <a:bodyPr wrap="none" rtlCol="0">
+            <a:spAutoFit/>
+          </a:bodyPr>
+          <a:lstStyle/>
+          <a:p>
+            <a:r>
+              <a:rPr lang="en-US" dirty="0" err="1" smtClean="0"/>
+              <a:t>Analyse</a:t>
+            </a:r>
+            <a:r>
+              <a:rPr lang="en-US" dirty="0" smtClean="0"/>
+              <a:t> </a:t>
+            </a:r>
+            <a:r>
+              <a:rPr lang="en-US" dirty="0" err="1" smtClean="0"/>
+              <a:t>Geogrphical</a:t>
+            </a:r>
+            <a:r>
+              <a:rPr lang="en-US" dirty="0" smtClean="0"/>
+              <a:t> Sale Data</a:t>
+            </a:r>
+            <a:endParaRPr lang="en-US" dirty="0"/>
+          </a:p>
+        </p:txBody>
+      </p:sp>
+      <p:sp>
+        <p:nvSpPr>
+          <p:cNvPr id="22" name="TextBox 21"/>
+          <p:cNvSpPr txBox="1"/>
+          <p:nvPr/>
+        </p:nvSpPr>
+        <p:spPr>
+          <a:xfrm>
+            <a:off x="1153308" y="5272058"/>
+            <a:ext cx="2673489" cy="369332"/>
+          </a:xfrm>
+          <a:prstGeom prst="rect">
+            <a:avLst/>
+          </a:prstGeom>
+          <a:noFill/>
+        </p:spPr>
+        <p:txBody>
+          <a:bodyPr wrap="none" rtlCol="0">
+            <a:spAutoFit/>
+          </a:bodyPr>
+          <a:lstStyle/>
+          <a:p>
+            <a:r>
+              <a:rPr lang="en-US" dirty="0" smtClean="0"/>
+              <a:t>Google Merchandise Store</a:t>
+            </a:r>
+            <a:endParaRPr lang="en-US" dirty="0"/>
+          </a:p>
+        </p:txBody>
+      </p:sp>
+    </p:spTree>
+    <p:extLst>
+      <p:ext uri="{BB962C8B-B14F-4D97-AF65-F5344CB8AC3E}">
+        <p14:creationId xmlns:p14="http://schemas.microsoft.com/office/powerpoint/2010/main" val="3530710695"/>
+      </p:ext>
+    </p:extLst>
+  </p:cSld>
+  <p:clrMapOvr>
+    <a:masterClrMapping/>
+  </p:clrMapOvr>
+  <p:timing>
+    <p:tnLst>
+      <p:par>
+        <p:cTn id="1" dur="indefinite" restart="never" nodeType="tmRoot"/>
+      </p:par>
+    </p:tnLst>
+  </p:timing>
+</p:sld>
+</file>
+
+<file path=ppt/slides/slide15.xml><?xml version="1.0" encoding="utf-8"?>
+<p:sld xmlns:a="http://schemas.openxmlformats.org/drawingml/2006/main" xmlns:r="http://schemas.openxmlformats.org/officeDocument/2006/relationships" xmlns:p="http://schemas.openxmlformats.org/presentationml/2006/main">
+  <p:cSld>
+    <p:bg>
+      <p:bgPr>
+        <a:solidFill>
+          <a:schemeClr val="bg1"/>
+        </a:solidFill>
+        <a:effectLst/>
+      </p:bgPr>
+    </p:bg>
+    <p:spTree>
+      <p:nvGrpSpPr>
+        <p:cNvPr id="1" name=""/>
+        <p:cNvGrpSpPr/>
+        <p:nvPr/>
+      </p:nvGrpSpPr>
+      <p:grpSpPr>
+        <a:xfrm>
+          <a:off x="0" y="0"/>
+          <a:ext cx="0" cy="0"/>
+          <a:chOff x="0" y="0"/>
+          <a:chExt cx="0" cy="0"/>
+        </a:xfrm>
+      </p:grpSpPr>
+      <p:pic>
+        <p:nvPicPr>
+          <p:cNvPr id="2" name="Picture 1"/>
+          <p:cNvPicPr>
+            <a:picLocks noChangeAspect="1"/>
+          </p:cNvPicPr>
+          <p:nvPr/>
+        </p:nvPicPr>
+        <p:blipFill>
+          <a:blip r:embed="rId2">
+            <a:extLst>
+              <a:ext uri="{28A0092B-C50C-407E-A947-70E740481C1C}">
+                <a14:useLocalDpi xmlns:a14="http://schemas.microsoft.com/office/drawing/2010/main" val="0"/>
+              </a:ext>
+            </a:extLst>
+          </a:blip>
+          <a:stretch>
+            <a:fillRect/>
+          </a:stretch>
+        </p:blipFill>
+        <p:spPr>
+          <a:xfrm>
+            <a:off x="1881052" y="392081"/>
+            <a:ext cx="8764423" cy="6060301"/>
+          </a:xfrm>
+          <a:prstGeom prst="rect">
+            <a:avLst/>
+          </a:prstGeom>
+        </p:spPr>
+      </p:pic>
+    </p:spTree>
+    <p:extLst>
+      <p:ext uri="{BB962C8B-B14F-4D97-AF65-F5344CB8AC3E}">
+        <p14:creationId xmlns:p14="http://schemas.microsoft.com/office/powerpoint/2010/main" val="229813232"/>
+      </p:ext>
+    </p:extLst>
+  </p:cSld>
+  <p:clrMapOvr>
+    <a:masterClrMapping/>
+  </p:clrMapOvr>
+  <p:timing>
+    <p:tnLst>
+      <p:par>
+        <p:cTn id="1" dur="indefinite" restart="never" nodeType="tmRoot"/>
+      </p:par>
+    </p:tnLst>
+  </p:timing>
+</p:sld>
+</file>
+
+<file path=ppt/slides/slide16.xml><?xml version="1.0" encoding="utf-8"?>
+<p:sld xmlns:a="http://schemas.openxmlformats.org/drawingml/2006/main" xmlns:r="http://schemas.openxmlformats.org/officeDocument/2006/relationships" xmlns:p="http://schemas.openxmlformats.org/presentationml/2006/main">
+  <p:cSld>
+    <p:spTree>
+      <p:nvGrpSpPr>
+        <p:cNvPr id="1" name=""/>
+        <p:cNvGrpSpPr/>
+        <p:nvPr/>
+      </p:nvGrpSpPr>
+      <p:grpSpPr>
+        <a:xfrm>
+          <a:off x="0" y="0"/>
+          <a:ext cx="0" cy="0"/>
+          <a:chOff x="0" y="0"/>
+          <a:chExt cx="0" cy="0"/>
+        </a:xfrm>
+      </p:grpSpPr>
+      <p:sp>
+        <p:nvSpPr>
+          <p:cNvPr id="2" name="Title 1"/>
+          <p:cNvSpPr>
+            <a:spLocks noGrp="1"/>
+          </p:cNvSpPr>
+          <p:nvPr>
+            <p:ph type="title"/>
+          </p:nvPr>
+        </p:nvSpPr>
+        <p:spPr/>
+        <p:txBody>
+          <a:bodyPr/>
+          <a:lstStyle/>
+          <a:p>
+            <a:r>
+              <a:rPr lang="en-US" dirty="0" smtClean="0"/>
+              <a:t>Different Kinds of Businesses Can </a:t>
+            </a:r>
+            <a:r>
+              <a:rPr lang="en-US" dirty="0"/>
+              <a:t>B</a:t>
+            </a:r>
+            <a:r>
+              <a:rPr lang="en-US" dirty="0" smtClean="0"/>
+              <a:t>enefit From Digital Analytics</a:t>
+            </a:r>
+            <a:endParaRPr lang="en-US" dirty="0"/>
+          </a:p>
+        </p:txBody>
+      </p:sp>
+      <p:sp>
+        <p:nvSpPr>
+          <p:cNvPr id="3" name="Content Placeholder 2"/>
+          <p:cNvSpPr>
+            <a:spLocks noGrp="1"/>
+          </p:cNvSpPr>
+          <p:nvPr>
+            <p:ph idx="1"/>
+          </p:nvPr>
+        </p:nvSpPr>
+        <p:spPr/>
+        <p:txBody>
+          <a:bodyPr/>
+          <a:lstStyle/>
+          <a:p>
+            <a:r>
+              <a:rPr lang="en-US" dirty="0" smtClean="0"/>
+              <a:t>Publishers can used it to create a loyal, highly-engaged audience and to better align on-site advertising with user interests.</a:t>
+            </a:r>
+          </a:p>
+          <a:p>
+            <a:r>
+              <a:rPr lang="en-US" dirty="0" smtClean="0"/>
+              <a:t>Ecommerce businesses can use digital analytics to understand their customers online purchasing behavior and better market their products and services.</a:t>
+            </a:r>
+          </a:p>
+          <a:p>
+            <a:r>
+              <a:rPr lang="en-US" dirty="0" smtClean="0"/>
+              <a:t>Lead generation sites can collect user information for sales teams to connect with potential leads.</a:t>
+            </a:r>
+          </a:p>
+          <a:p>
+            <a:pPr marL="0" indent="0">
+              <a:buNone/>
+            </a:pPr>
+            <a:endParaRPr lang="en-US" dirty="0"/>
+          </a:p>
+        </p:txBody>
+      </p:sp>
+    </p:spTree>
+    <p:extLst>
+      <p:ext uri="{BB962C8B-B14F-4D97-AF65-F5344CB8AC3E}">
+        <p14:creationId xmlns:p14="http://schemas.microsoft.com/office/powerpoint/2010/main" val="3030566907"/>
+      </p:ext>
+    </p:extLst>
+  </p:cSld>
+  <p:clrMapOvr>
+    <a:masterClrMapping/>
+  </p:clrMapOvr>
+  <p:timing>
+    <p:tnLst>
+      <p:par>
+        <p:cTn id="1" dur="indefinite" restart="never" nodeType="tmRoot"/>
+      </p:par>
+    </p:tnLst>
+  </p:timing>
+</p:sld>
+</file>
+
+<file path=ppt/slides/slide17.xml><?xml version="1.0" encoding="utf-8"?>
+<p:sld xmlns:a="http://schemas.openxmlformats.org/drawingml/2006/main" xmlns:r="http://schemas.openxmlformats.org/officeDocument/2006/relationships" xmlns:p="http://schemas.openxmlformats.org/presentationml/2006/main">
+  <p:cSld>
+    <p:spTree>
+      <p:nvGrpSpPr>
+        <p:cNvPr id="1" name=""/>
+        <p:cNvGrpSpPr/>
+        <p:nvPr/>
+      </p:nvGrpSpPr>
+      <p:grpSpPr>
+        <a:xfrm>
+          <a:off x="0" y="0"/>
+          <a:ext cx="0" cy="0"/>
+          <a:chOff x="0" y="0"/>
+          <a:chExt cx="0" cy="0"/>
+        </a:xfrm>
+      </p:grpSpPr>
+      <p:sp>
+        <p:nvSpPr>
+          <p:cNvPr id="3" name="Content Placeholder 2"/>
+          <p:cNvSpPr>
+            <a:spLocks noGrp="1"/>
+          </p:cNvSpPr>
+          <p:nvPr>
+            <p:ph idx="1"/>
+          </p:nvPr>
+        </p:nvSpPr>
+        <p:spPr>
+          <a:xfrm>
+            <a:off x="838200" y="522514"/>
+            <a:ext cx="10515600" cy="5654449"/>
+          </a:xfrm>
+        </p:spPr>
+        <p:txBody>
+          <a:bodyPr/>
+          <a:lstStyle/>
+          <a:p>
+            <a:pPr marL="0" indent="0">
+              <a:buNone/>
+            </a:pPr>
+            <a:r>
+              <a:rPr lang="en-US" sz="3600" dirty="0" smtClean="0">
+                <a:latin typeface="+mj-lt"/>
+              </a:rPr>
+              <a:t>Digital Analytics can collect user behavioral data from a variety of systems such as –</a:t>
+            </a:r>
+          </a:p>
+          <a:p>
+            <a:pPr marL="0" indent="0">
+              <a:buNone/>
+            </a:pPr>
+            <a:endParaRPr lang="en-US" dirty="0" smtClean="0"/>
+          </a:p>
+          <a:p>
+            <a:r>
+              <a:rPr lang="en-US" dirty="0" smtClean="0"/>
+              <a:t>Mobile Apps</a:t>
+            </a:r>
+          </a:p>
+          <a:p>
+            <a:r>
+              <a:rPr lang="en-US" dirty="0" smtClean="0"/>
+              <a:t>Online point-of-sales systems</a:t>
+            </a:r>
+          </a:p>
+          <a:p>
+            <a:r>
+              <a:rPr lang="en-US" dirty="0" smtClean="0"/>
+              <a:t>Video Game Consoles</a:t>
+            </a:r>
+          </a:p>
+          <a:p>
+            <a:r>
+              <a:rPr lang="en-US" dirty="0" smtClean="0"/>
+              <a:t>Customer Relationship Management Systems</a:t>
+            </a:r>
+          </a:p>
+          <a:p>
+            <a:r>
+              <a:rPr lang="en-US" dirty="0" smtClean="0"/>
+              <a:t>Internet-connected platforms</a:t>
+            </a:r>
+          </a:p>
+          <a:p>
+            <a:endParaRPr lang="en-US" dirty="0"/>
+          </a:p>
+        </p:txBody>
+      </p:sp>
+    </p:spTree>
+    <p:extLst>
+      <p:ext uri="{BB962C8B-B14F-4D97-AF65-F5344CB8AC3E}">
+        <p14:creationId xmlns:p14="http://schemas.microsoft.com/office/powerpoint/2010/main" val="1971007297"/>
+      </p:ext>
+    </p:extLst>
+  </p:cSld>
+  <p:clrMapOvr>
+    <a:masterClrMapping/>
+  </p:clrMapOvr>
+  <p:timing>
+    <p:tnLst>
+      <p:par>
+        <p:cTn id="1" dur="indefinite" restart="never" nodeType="tmRoot"/>
+      </p:par>
+    </p:tnLst>
+  </p:timing>
+</p:sld>
+</file>
+
+<file path=ppt/slides/slide18.xml><?xml version="1.0" encoding="utf-8"?>
+<p:sld xmlns:a="http://schemas.openxmlformats.org/drawingml/2006/main" xmlns:r="http://schemas.openxmlformats.org/officeDocument/2006/relationships" xmlns:p="http://schemas.openxmlformats.org/presentationml/2006/main">
+  <p:cSld>
+    <p:spTree>
+      <p:nvGrpSpPr>
+        <p:cNvPr id="1" name=""/>
+        <p:cNvGrpSpPr/>
+        <p:nvPr/>
+      </p:nvGrpSpPr>
+      <p:grpSpPr>
+        <a:xfrm>
+          <a:off x="0" y="0"/>
+          <a:ext cx="0" cy="0"/>
+          <a:chOff x="0" y="0"/>
+          <a:chExt cx="0" cy="0"/>
+        </a:xfrm>
+      </p:grpSpPr>
+      <p:sp>
+        <p:nvSpPr>
+          <p:cNvPr id="2" name="Title 1"/>
+          <p:cNvSpPr>
+            <a:spLocks noGrp="1"/>
+          </p:cNvSpPr>
+          <p:nvPr>
+            <p:ph type="title"/>
+          </p:nvPr>
+        </p:nvSpPr>
+        <p:spPr/>
+        <p:txBody>
+          <a:bodyPr/>
+          <a:lstStyle/>
+          <a:p>
+            <a:r>
+              <a:rPr lang="en-US" dirty="0" smtClean="0"/>
+              <a:t>What is Google Analytics?</a:t>
+            </a:r>
+            <a:endParaRPr lang="en-US" dirty="0"/>
+          </a:p>
+        </p:txBody>
+      </p:sp>
+      <p:sp>
+        <p:nvSpPr>
+          <p:cNvPr id="3" name="Content Placeholder 2"/>
+          <p:cNvSpPr>
+            <a:spLocks noGrp="1"/>
+          </p:cNvSpPr>
+          <p:nvPr>
+            <p:ph idx="1"/>
+          </p:nvPr>
+        </p:nvSpPr>
+        <p:spPr/>
+        <p:txBody>
+          <a:bodyPr/>
+          <a:lstStyle/>
+          <a:p>
+            <a:r>
+              <a:rPr lang="en-US" dirty="0" smtClean="0"/>
+              <a:t>Google Analytics is a platform that collects data and compiles it into useful reports.</a:t>
+            </a:r>
+            <a:endParaRPr lang="en-US" dirty="0"/>
+          </a:p>
+        </p:txBody>
+      </p:sp>
+    </p:spTree>
+    <p:extLst>
+      <p:ext uri="{BB962C8B-B14F-4D97-AF65-F5344CB8AC3E}">
+        <p14:creationId xmlns:p14="http://schemas.microsoft.com/office/powerpoint/2010/main" val="862627204"/>
+      </p:ext>
+    </p:extLst>
+  </p:cSld>
+  <p:clrMapOvr>
+    <a:masterClrMapping/>
+  </p:clrMapOvr>
+</p:sld>
+</file>
+
+<file path=ppt/slides/slide19.xml><?xml version="1.0" encoding="utf-8"?>
+<p:sld xmlns:a="http://schemas.openxmlformats.org/drawingml/2006/main" xmlns:r="http://schemas.openxmlformats.org/officeDocument/2006/relationships" xmlns:p="http://schemas.openxmlformats.org/presentationml/2006/main">
+  <p:cSld>
+    <p:spTree>
+      <p:nvGrpSpPr>
+        <p:cNvPr id="1" name=""/>
+        <p:cNvGrpSpPr/>
+        <p:nvPr/>
+      </p:nvGrpSpPr>
+      <p:grpSpPr>
+        <a:xfrm>
+          <a:off x="0" y="0"/>
+          <a:ext cx="0" cy="0"/>
+          <a:chOff x="0" y="0"/>
+          <a:chExt cx="0" cy="0"/>
+        </a:xfrm>
+      </p:grpSpPr>
+      <p:sp>
+        <p:nvSpPr>
+          <p:cNvPr id="2" name="Title 1"/>
+          <p:cNvSpPr>
+            <a:spLocks noGrp="1"/>
+          </p:cNvSpPr>
+          <p:nvPr>
+            <p:ph type="title"/>
+          </p:nvPr>
+        </p:nvSpPr>
+        <p:spPr/>
+        <p:txBody>
+          <a:bodyPr/>
+          <a:lstStyle/>
+          <a:p>
+            <a:r>
+              <a:rPr lang="en-US" dirty="0" smtClean="0"/>
+              <a:t>How to track a Web Site?</a:t>
+            </a:r>
+            <a:endParaRPr lang="en-US" dirty="0"/>
+          </a:p>
+        </p:txBody>
+      </p:sp>
+      <p:sp>
+        <p:nvSpPr>
+          <p:cNvPr id="3" name="Content Placeholder 2"/>
+          <p:cNvSpPr>
+            <a:spLocks noGrp="1"/>
+          </p:cNvSpPr>
+          <p:nvPr>
+            <p:ph idx="1"/>
+          </p:nvPr>
+        </p:nvSpPr>
+        <p:spPr/>
+        <p:txBody>
+          <a:bodyPr/>
+          <a:lstStyle/>
+          <a:p>
+            <a:r>
+              <a:rPr lang="en-US" dirty="0" smtClean="0"/>
+              <a:t>Create Google Analytics Account ( </a:t>
+            </a:r>
+            <a:r>
+              <a:rPr lang="en-US" dirty="0" smtClean="0">
+                <a:hlinkClick r:id="rId2"/>
+              </a:rPr>
+              <a:t>http</a:t>
+            </a:r>
+            <a:r>
+              <a:rPr lang="en-US" dirty="0">
+                <a:hlinkClick r:id="rId2"/>
+              </a:rPr>
+              <a:t>://</a:t>
+            </a:r>
+            <a:r>
+              <a:rPr lang="en-US" dirty="0" smtClean="0">
+                <a:hlinkClick r:id="rId2"/>
+              </a:rPr>
+              <a:t>analytics.google.com</a:t>
+            </a:r>
+            <a:r>
+              <a:rPr lang="en-US" dirty="0" smtClean="0"/>
+              <a:t> )</a:t>
+            </a:r>
+          </a:p>
+          <a:p>
+            <a:r>
+              <a:rPr lang="en-US" dirty="0" smtClean="0"/>
+              <a:t>Add a small piece of </a:t>
+            </a:r>
+            <a:r>
+              <a:rPr lang="en-US" dirty="0" err="1" smtClean="0"/>
+              <a:t>javascript</a:t>
+            </a:r>
+            <a:r>
+              <a:rPr lang="en-US" dirty="0" smtClean="0"/>
+              <a:t> tracking code to each page on your site.</a:t>
+            </a:r>
+          </a:p>
+        </p:txBody>
+      </p:sp>
+    </p:spTree>
+    <p:extLst>
+      <p:ext uri="{BB962C8B-B14F-4D97-AF65-F5344CB8AC3E}">
+        <p14:creationId xmlns:p14="http://schemas.microsoft.com/office/powerpoint/2010/main" val="3295472496"/>
+      </p:ext>
+    </p:extLst>
+  </p:cSld>
+  <p:clrMapOvr>
+    <a:masterClrMapping/>
+  </p:clrMapOvr>
+  <p:timing>
+    <p:tnLst>
+      <p:par>
+        <p:cTn id="1" dur="indefinite" restart="never" nodeType="tmRoot"/>
+      </p:par>
+    </p:tnLst>
+  </p:timing>
 </p:sld>
 </file>
 
@@ -3800,6 +4732,124 @@
   <p:clrMapOvr>
     <a:masterClrMapping/>
   </p:clrMapOvr>
+</p:sld>
+</file>
+
+<file path=ppt/slides/slide20.xml><?xml version="1.0" encoding="utf-8"?>
+<p:sld xmlns:a="http://schemas.openxmlformats.org/drawingml/2006/main" xmlns:r="http://schemas.openxmlformats.org/officeDocument/2006/relationships" xmlns:p="http://schemas.openxmlformats.org/presentationml/2006/main">
+  <p:cSld>
+    <p:spTree>
+      <p:nvGrpSpPr>
+        <p:cNvPr id="1" name=""/>
+        <p:cNvGrpSpPr/>
+        <p:nvPr/>
+      </p:nvGrpSpPr>
+      <p:grpSpPr>
+        <a:xfrm>
+          <a:off x="0" y="0"/>
+          <a:ext cx="0" cy="0"/>
+          <a:chOff x="0" y="0"/>
+          <a:chExt cx="0" cy="0"/>
+        </a:xfrm>
+      </p:grpSpPr>
+      <p:sp>
+        <p:nvSpPr>
+          <p:cNvPr id="2" name="Title 1"/>
+          <p:cNvSpPr>
+            <a:spLocks noGrp="1"/>
+          </p:cNvSpPr>
+          <p:nvPr>
+            <p:ph type="title"/>
+          </p:nvPr>
+        </p:nvSpPr>
+        <p:spPr/>
+        <p:txBody>
+          <a:bodyPr/>
+          <a:lstStyle/>
+          <a:p>
+            <a:r>
+              <a:rPr lang="en-US" dirty="0" smtClean="0"/>
+              <a:t>What data can collect Tracking Code?</a:t>
+            </a:r>
+            <a:endParaRPr lang="en-US" dirty="0"/>
+          </a:p>
+        </p:txBody>
+      </p:sp>
+      <p:sp>
+        <p:nvSpPr>
+          <p:cNvPr id="3" name="Content Placeholder 2"/>
+          <p:cNvSpPr>
+            <a:spLocks noGrp="1"/>
+          </p:cNvSpPr>
+          <p:nvPr>
+            <p:ph idx="1"/>
+          </p:nvPr>
+        </p:nvSpPr>
+        <p:spPr>
+          <a:xfrm>
+            <a:off x="838199" y="1825625"/>
+            <a:ext cx="11192692" cy="4351338"/>
+          </a:xfrm>
+        </p:spPr>
+        <p:txBody>
+          <a:bodyPr/>
+          <a:lstStyle/>
+          <a:p>
+            <a:r>
+              <a:rPr lang="en-US" dirty="0" smtClean="0"/>
+              <a:t>Browser Language</a:t>
+            </a:r>
+          </a:p>
+          <a:p>
+            <a:r>
+              <a:rPr lang="en-US" dirty="0" smtClean="0"/>
+              <a:t>Type of Browser ( Chrome or Safari )</a:t>
+            </a:r>
+          </a:p>
+          <a:p>
+            <a:r>
+              <a:rPr lang="en-US" dirty="0" smtClean="0"/>
+              <a:t>Device and Operating System</a:t>
+            </a:r>
+          </a:p>
+          <a:p>
+            <a:r>
+              <a:rPr lang="en-US" dirty="0" smtClean="0"/>
+              <a:t>Traffic Source</a:t>
+            </a:r>
+          </a:p>
+          <a:p>
+            <a:pPr marL="0" indent="0">
+              <a:buNone/>
+            </a:pPr>
+            <a:r>
+              <a:rPr lang="en-US" dirty="0"/>
+              <a:t> </a:t>
+            </a:r>
+            <a:r>
+              <a:rPr lang="en-US" dirty="0" smtClean="0"/>
+              <a:t>  ( Search Engine, Advertisement, Email Marketing Campaign )</a:t>
+            </a:r>
+          </a:p>
+        </p:txBody>
+      </p:sp>
+    </p:spTree>
+    <p:extLst>
+      <p:ext uri="{BB962C8B-B14F-4D97-AF65-F5344CB8AC3E}">
+        <p14:creationId xmlns:p14="http://schemas.microsoft.com/office/powerpoint/2010/main" val="32474272"/>
+      </p:ext>
+    </p:extLst>
+  </p:cSld>
+  <p:clrMapOvr>
+    <a:masterClrMapping/>
+  </p:clrMapOvr>
+  <p:timing>
+    <p:tnLst>
+      <p:par>
+        <p:cTn id="1" dur="indefinite" restart="never" nodeType="tmRoot"/>
+      </p:par>
+    </p:tnLst>
+  </p:timing>
 </p:sld>
 </file>
 

</xml_diff>